<commit_message>
add /code_kaggle_btrotta sub-dir with NB99 (notebook), readme, setup_linux and .hdf5 files
</commit_message>
<xml_diff>
--- a/Kaggle_PLAsTiCC_and_B_Trotta_code_walk.pptx
+++ b/Kaggle_PLAsTiCC_and_B_Trotta_code_walk.pptx
@@ -28,27 +28,32 @@
     <p:sldId id="287" r:id="rId22"/>
     <p:sldId id="276" r:id="rId23"/>
     <p:sldId id="305" r:id="rId24"/>
-    <p:sldId id="278" r:id="rId25"/>
-    <p:sldId id="279" r:id="rId26"/>
-    <p:sldId id="280" r:id="rId27"/>
-    <p:sldId id="282" r:id="rId28"/>
-    <p:sldId id="283" r:id="rId29"/>
-    <p:sldId id="286" r:id="rId30"/>
-    <p:sldId id="290" r:id="rId31"/>
-    <p:sldId id="298" r:id="rId32"/>
-    <p:sldId id="288" r:id="rId33"/>
-    <p:sldId id="291" r:id="rId34"/>
-    <p:sldId id="299" r:id="rId35"/>
-    <p:sldId id="289" r:id="rId36"/>
-    <p:sldId id="292" r:id="rId37"/>
-    <p:sldId id="300" r:id="rId38"/>
-    <p:sldId id="294" r:id="rId39"/>
-    <p:sldId id="297" r:id="rId40"/>
-    <p:sldId id="301" r:id="rId41"/>
-    <p:sldId id="302" r:id="rId42"/>
-    <p:sldId id="295" r:id="rId43"/>
-    <p:sldId id="303" r:id="rId44"/>
-    <p:sldId id="304" r:id="rId45"/>
+    <p:sldId id="311" r:id="rId25"/>
+    <p:sldId id="306" r:id="rId26"/>
+    <p:sldId id="279" r:id="rId27"/>
+    <p:sldId id="280" r:id="rId28"/>
+    <p:sldId id="282" r:id="rId29"/>
+    <p:sldId id="283" r:id="rId30"/>
+    <p:sldId id="286" r:id="rId31"/>
+    <p:sldId id="290" r:id="rId32"/>
+    <p:sldId id="298" r:id="rId33"/>
+    <p:sldId id="288" r:id="rId34"/>
+    <p:sldId id="291" r:id="rId35"/>
+    <p:sldId id="299" r:id="rId36"/>
+    <p:sldId id="289" r:id="rId37"/>
+    <p:sldId id="292" r:id="rId38"/>
+    <p:sldId id="300" r:id="rId39"/>
+    <p:sldId id="294" r:id="rId40"/>
+    <p:sldId id="297" r:id="rId41"/>
+    <p:sldId id="301" r:id="rId42"/>
+    <p:sldId id="302" r:id="rId43"/>
+    <p:sldId id="295" r:id="rId44"/>
+    <p:sldId id="307" r:id="rId45"/>
+    <p:sldId id="308" r:id="rId46"/>
+    <p:sldId id="309" r:id="rId47"/>
+    <p:sldId id="310" r:id="rId48"/>
+    <p:sldId id="303" r:id="rId49"/>
+    <p:sldId id="304" r:id="rId50"/>
   </p:sldIdLst>
   <p:sldSz cx="12192000" cy="6858000"/>
   <p:notesSz cx="6858000" cy="9144000"/>
@@ -179,7 +184,8 @@
             <p14:sldId id="287"/>
             <p14:sldId id="276"/>
             <p14:sldId id="305"/>
-            <p14:sldId id="278"/>
+            <p14:sldId id="311"/>
+            <p14:sldId id="306"/>
             <p14:sldId id="279"/>
             <p14:sldId id="280"/>
             <p14:sldId id="282"/>
@@ -198,6 +204,10 @@
             <p14:sldId id="301"/>
             <p14:sldId id="302"/>
             <p14:sldId id="295"/>
+            <p14:sldId id="307"/>
+            <p14:sldId id="308"/>
+            <p14:sldId id="309"/>
+            <p14:sldId id="310"/>
             <p14:sldId id="303"/>
             <p14:sldId id="304"/>
           </p14:sldIdLst>
@@ -358,7 +368,7 @@
           <a:p>
             <a:fld id="{8C0DEE79-F353-423A-AB95-FEAAA2F71F16}" type="datetimeFigureOut">
               <a:rPr lang="en-US" smtClean="0"/>
-              <a:t>6/11/2020</a:t>
+              <a:t>6/17/2020</a:t>
             </a:fld>
             <a:endParaRPr lang="en-US"/>
           </a:p>
@@ -556,7 +566,7 @@
           <a:p>
             <a:fld id="{8C0DEE79-F353-423A-AB95-FEAAA2F71F16}" type="datetimeFigureOut">
               <a:rPr lang="en-US" smtClean="0"/>
-              <a:t>6/11/2020</a:t>
+              <a:t>6/17/2020</a:t>
             </a:fld>
             <a:endParaRPr lang="en-US"/>
           </a:p>
@@ -764,7 +774,7 @@
           <a:p>
             <a:fld id="{8C0DEE79-F353-423A-AB95-FEAAA2F71F16}" type="datetimeFigureOut">
               <a:rPr lang="en-US" smtClean="0"/>
-              <a:t>6/11/2020</a:t>
+              <a:t>6/17/2020</a:t>
             </a:fld>
             <a:endParaRPr lang="en-US"/>
           </a:p>
@@ -962,7 +972,7 @@
           <a:p>
             <a:fld id="{8C0DEE79-F353-423A-AB95-FEAAA2F71F16}" type="datetimeFigureOut">
               <a:rPr lang="en-US" smtClean="0"/>
-              <a:t>6/11/2020</a:t>
+              <a:t>6/17/2020</a:t>
             </a:fld>
             <a:endParaRPr lang="en-US"/>
           </a:p>
@@ -1237,7 +1247,7 @@
           <a:p>
             <a:fld id="{8C0DEE79-F353-423A-AB95-FEAAA2F71F16}" type="datetimeFigureOut">
               <a:rPr lang="en-US" smtClean="0"/>
-              <a:t>6/11/2020</a:t>
+              <a:t>6/17/2020</a:t>
             </a:fld>
             <a:endParaRPr lang="en-US"/>
           </a:p>
@@ -1502,7 +1512,7 @@
           <a:p>
             <a:fld id="{8C0DEE79-F353-423A-AB95-FEAAA2F71F16}" type="datetimeFigureOut">
               <a:rPr lang="en-US" smtClean="0"/>
-              <a:t>6/11/2020</a:t>
+              <a:t>6/17/2020</a:t>
             </a:fld>
             <a:endParaRPr lang="en-US"/>
           </a:p>
@@ -1914,7 +1924,7 @@
           <a:p>
             <a:fld id="{8C0DEE79-F353-423A-AB95-FEAAA2F71F16}" type="datetimeFigureOut">
               <a:rPr lang="en-US" smtClean="0"/>
-              <a:t>6/11/2020</a:t>
+              <a:t>6/17/2020</a:t>
             </a:fld>
             <a:endParaRPr lang="en-US"/>
           </a:p>
@@ -2055,7 +2065,7 @@
           <a:p>
             <a:fld id="{8C0DEE79-F353-423A-AB95-FEAAA2F71F16}" type="datetimeFigureOut">
               <a:rPr lang="en-US" smtClean="0"/>
-              <a:t>6/11/2020</a:t>
+              <a:t>6/17/2020</a:t>
             </a:fld>
             <a:endParaRPr lang="en-US"/>
           </a:p>
@@ -2168,7 +2178,7 @@
           <a:p>
             <a:fld id="{8C0DEE79-F353-423A-AB95-FEAAA2F71F16}" type="datetimeFigureOut">
               <a:rPr lang="en-US" smtClean="0"/>
-              <a:t>6/11/2020</a:t>
+              <a:t>6/17/2020</a:t>
             </a:fld>
             <a:endParaRPr lang="en-US"/>
           </a:p>
@@ -2479,7 +2489,7 @@
           <a:p>
             <a:fld id="{8C0DEE79-F353-423A-AB95-FEAAA2F71F16}" type="datetimeFigureOut">
               <a:rPr lang="en-US" smtClean="0"/>
-              <a:t>6/11/2020</a:t>
+              <a:t>6/17/2020</a:t>
             </a:fld>
             <a:endParaRPr lang="en-US"/>
           </a:p>
@@ -2767,7 +2777,7 @@
           <a:p>
             <a:fld id="{8C0DEE79-F353-423A-AB95-FEAAA2F71F16}" type="datetimeFigureOut">
               <a:rPr lang="en-US" smtClean="0"/>
-              <a:t>6/11/2020</a:t>
+              <a:t>6/17/2020</a:t>
             </a:fld>
             <a:endParaRPr lang="en-US"/>
           </a:p>
@@ -3008,7 +3018,7 @@
           <a:p>
             <a:fld id="{8C0DEE79-F353-423A-AB95-FEAAA2F71F16}" type="datetimeFigureOut">
               <a:rPr lang="en-US" smtClean="0"/>
-              <a:t>6/11/2020</a:t>
+              <a:t>6/17/2020</a:t>
             </a:fld>
             <a:endParaRPr lang="en-US"/>
           </a:p>
@@ -4403,17 +4413,17 @@
           <a:p>
             <a:r>
               <a:rPr lang="en-US" dirty="0"/>
-              <a:t>19GB, 500M samples</a:t>
+              <a:t>19GB, 510M samples</a:t>
             </a:r>
           </a:p>
         </p:txBody>
       </p:sp>
       <p:pic>
         <p:nvPicPr>
-          <p:cNvPr id="3" name="Picture 2">
-            <a:extLst>
-              <a:ext uri="{FF2B5EF4-FFF2-40B4-BE49-F238E27FC236}">
-                <a16:creationId xmlns:a16="http://schemas.microsoft.com/office/drawing/2014/main" id="{AB3F360A-FE93-405B-B355-368603B0D2BB}"/>
+          <p:cNvPr id="4" name="Picture 3">
+            <a:extLst>
+              <a:ext uri="{FF2B5EF4-FFF2-40B4-BE49-F238E27FC236}">
+                <a16:creationId xmlns:a16="http://schemas.microsoft.com/office/drawing/2014/main" id="{4DDB6384-617C-4B87-8577-3C8DE43A1BBA}"/>
               </a:ext>
             </a:extLst>
           </p:cNvPr>
@@ -4430,8 +4440,8 @@
         </p:blipFill>
         <p:spPr>
           <a:xfrm>
-            <a:off x="1018213" y="1835223"/>
-            <a:ext cx="10591800" cy="4429125"/>
+            <a:off x="2628025" y="2102594"/>
+            <a:ext cx="6180073" cy="3658020"/>
           </a:xfrm>
           <a:prstGeom prst="rect">
             <a:avLst/>
@@ -4496,7 +4506,7 @@
           <a:p>
             <a:r>
               <a:rPr lang="en-US" dirty="0"/>
-              <a:t>Data Flow</a:t>
+              <a:t>Data Flow (big picture)</a:t>
             </a:r>
           </a:p>
         </p:txBody>
@@ -5237,14 +5247,14 @@
             <a:pPr lvl="1"/>
             <a:r>
               <a:rPr lang="en-US" sz="2000" dirty="0"/>
-              <a:t>Run “split_test.py” Splits data into 100 .hdf5 files - takes about 15 minutes</a:t>
+              <a:t>Run “split_test.py” Splits data into 100 .hdf5 files (about 15 minutes)</a:t>
             </a:r>
           </a:p>
           <a:p>
             <a:pPr lvl="1"/>
             <a:r>
               <a:rPr lang="en-US" sz="2000" dirty="0"/>
-              <a:t>Run “calculate_features.py” generates 3 features files – takes about 3.5 hours</a:t>
+              <a:t>Run “calculate_features.py” generates 3 features files (about 3.5 hours)</a:t>
             </a:r>
           </a:p>
           <a:p>
@@ -5368,40 +5378,205 @@
           <a:chExt cx="0" cy="0"/>
         </a:xfrm>
       </p:grpSpPr>
-      <p:pic>
-        <p:nvPicPr>
-          <p:cNvPr id="4" name="Picture 3">
-            <a:extLst>
-              <a:ext uri="{FF2B5EF4-FFF2-40B4-BE49-F238E27FC236}">
-                <a16:creationId xmlns:a16="http://schemas.microsoft.com/office/drawing/2014/main" id="{E46BE9BE-CBC1-4E8B-8D55-6232C568B2DA}"/>
-              </a:ext>
-            </a:extLst>
-          </p:cNvPr>
-          <p:cNvPicPr>
-            <a:picLocks noChangeAspect="1"/>
-          </p:cNvPicPr>
-          <p:nvPr/>
-        </p:nvPicPr>
-        <p:blipFill>
-          <a:blip r:embed="rId2"/>
-          <a:stretch>
-            <a:fillRect/>
-          </a:stretch>
-        </p:blipFill>
-        <p:spPr>
-          <a:xfrm>
-            <a:off x="1613045" y="1136599"/>
-            <a:ext cx="8839637" cy="5305943"/>
-          </a:xfrm>
-          <a:prstGeom prst="rect">
-            <a:avLst/>
-          </a:prstGeom>
-        </p:spPr>
-      </p:pic>
+      <p:sp>
+        <p:nvSpPr>
+          <p:cNvPr id="2" name="Title 1">
+            <a:extLst>
+              <a:ext uri="{FF2B5EF4-FFF2-40B4-BE49-F238E27FC236}">
+                <a16:creationId xmlns:a16="http://schemas.microsoft.com/office/drawing/2014/main" id="{B9FAFD56-86D3-4CDC-AD94-A2BF2C7CD136}"/>
+              </a:ext>
+            </a:extLst>
+          </p:cNvPr>
+          <p:cNvSpPr>
+            <a:spLocks noGrp="1"/>
+          </p:cNvSpPr>
+          <p:nvPr>
+            <p:ph type="title"/>
+          </p:nvPr>
+        </p:nvSpPr>
+        <p:spPr/>
+        <p:txBody>
+          <a:bodyPr/>
+          <a:lstStyle/>
+          <a:p>
+            <a:r>
+              <a:rPr lang="en-US" dirty="0"/>
+              <a:t>If you want to follow along..</a:t>
+            </a:r>
+          </a:p>
+        </p:txBody>
+      </p:sp>
+      <p:sp>
+        <p:nvSpPr>
+          <p:cNvPr id="3" name="Content Placeholder 2">
+            <a:extLst>
+              <a:ext uri="{FF2B5EF4-FFF2-40B4-BE49-F238E27FC236}">
+                <a16:creationId xmlns:a16="http://schemas.microsoft.com/office/drawing/2014/main" id="{55F6DF81-0C19-424C-ACAE-A70CF6A66F71}"/>
+              </a:ext>
+            </a:extLst>
+          </p:cNvPr>
+          <p:cNvSpPr>
+            <a:spLocks noGrp="1"/>
+          </p:cNvSpPr>
+          <p:nvPr>
+            <p:ph idx="1"/>
+          </p:nvPr>
+        </p:nvSpPr>
+        <p:spPr/>
+        <p:txBody>
+          <a:bodyPr>
+            <a:normAutofit fontScale="85000" lnSpcReduction="20000"/>
+          </a:bodyPr>
+          <a:lstStyle/>
+          <a:p>
+            <a:r>
+              <a:rPr lang="en-US" dirty="0"/>
+              <a:t>A Jupyter Notebook is available that “code walks” </a:t>
+            </a:r>
+            <a:r>
+              <a:rPr lang="en-US" dirty="0" err="1"/>
+              <a:t>B.Trotta</a:t>
+            </a:r>
+            <a:r>
+              <a:rPr lang="en-US" dirty="0"/>
+              <a:t>.  To use this a git of </a:t>
+            </a:r>
+            <a:r>
+              <a:rPr lang="en-US" dirty="0" err="1"/>
+              <a:t>B.Trotta</a:t>
+            </a:r>
+            <a:r>
+              <a:rPr lang="en-US" dirty="0"/>
+              <a:t> is populated within the </a:t>
+            </a:r>
+            <a:r>
+              <a:rPr lang="en-US" dirty="0" err="1"/>
+              <a:t>cwinsor</a:t>
+            </a:r>
+            <a:r>
+              <a:rPr lang="en-US" dirty="0"/>
+              <a:t> git </a:t>
+            </a:r>
+            <a:r>
+              <a:rPr lang="en-US" dirty="0" err="1"/>
+              <a:t>workarea</a:t>
+            </a:r>
+            <a:r>
+              <a:rPr lang="en-US" dirty="0"/>
+              <a:t>.</a:t>
+            </a:r>
+          </a:p>
+          <a:p>
+            <a:pPr marL="0" indent="0">
+              <a:buNone/>
+            </a:pPr>
+            <a:endParaRPr lang="en-US" dirty="0"/>
+          </a:p>
+          <a:p>
+            <a:r>
+              <a:rPr lang="en-US" dirty="0"/>
+              <a:t>Git clone </a:t>
+            </a:r>
+            <a:r>
+              <a:rPr lang="en-US" dirty="0">
+                <a:hlinkClick r:id="rId2"/>
+              </a:rPr>
+              <a:t>https://github.com/cwinsor/kaggle_plasticc.git</a:t>
+            </a:r>
+            <a:endParaRPr lang="en-US" dirty="0"/>
+          </a:p>
+          <a:p>
+            <a:r>
+              <a:rPr lang="en-US" dirty="0"/>
+              <a:t>cd </a:t>
+            </a:r>
+            <a:r>
+              <a:rPr lang="en-US" dirty="0" err="1"/>
+              <a:t>kaggle_plasticc</a:t>
+            </a:r>
+            <a:r>
+              <a:rPr lang="en-US" dirty="0"/>
+              <a:t>/</a:t>
+            </a:r>
+            <a:r>
+              <a:rPr lang="en-US" dirty="0" err="1"/>
+              <a:t>code_kaggle_plasticc_btrotta</a:t>
+            </a:r>
+            <a:r>
+              <a:rPr lang="en-US" dirty="0"/>
+              <a:t>/</a:t>
+            </a:r>
+          </a:p>
+          <a:p>
+            <a:r>
+              <a:rPr lang="en-US" dirty="0"/>
+              <a:t>You will see</a:t>
+            </a:r>
+          </a:p>
+          <a:p>
+            <a:pPr lvl="1"/>
+            <a:r>
+              <a:rPr lang="en-US" dirty="0"/>
+              <a:t>Jupyter notebook NB99_EXPLAIN_BTROTTA_CODE_WALK.ipynb</a:t>
+            </a:r>
+          </a:p>
+          <a:p>
+            <a:pPr lvl="1"/>
+            <a:r>
+              <a:rPr lang="en-US" dirty="0"/>
+              <a:t>requirments.txt</a:t>
+            </a:r>
+          </a:p>
+          <a:p>
+            <a:pPr lvl="1"/>
+            <a:r>
+              <a:rPr lang="en-US" dirty="0"/>
+              <a:t>setu_linux_btrotta.sh</a:t>
+            </a:r>
+          </a:p>
+          <a:p>
+            <a:pPr lvl="1"/>
+            <a:r>
+              <a:rPr lang="en-US" dirty="0"/>
+              <a:t>Use them</a:t>
+            </a:r>
+          </a:p>
+          <a:p>
+            <a:r>
+              <a:rPr lang="en-US" dirty="0"/>
+              <a:t>From there, git clone </a:t>
+            </a:r>
+            <a:r>
+              <a:rPr lang="en-US" dirty="0">
+                <a:hlinkClick r:id="rId3"/>
+              </a:rPr>
+              <a:t>https://github.com/btrotta/kaggle-plasticc.git</a:t>
+            </a:r>
+            <a:endParaRPr lang="en-US" dirty="0"/>
+          </a:p>
+          <a:p>
+            <a:r>
+              <a:rPr lang="en-US" dirty="0"/>
+              <a:t>Run the Jupyter Notebook – you will find it uses files in the </a:t>
+            </a:r>
+            <a:r>
+              <a:rPr lang="en-US" dirty="0" err="1"/>
+              <a:t>B.Trotta</a:t>
+            </a:r>
+            <a:r>
+              <a:rPr lang="en-US" dirty="0"/>
+              <a:t> sub-git.  It should work!</a:t>
+            </a:r>
+          </a:p>
+          <a:p>
+            <a:endParaRPr lang="en-US" dirty="0"/>
+          </a:p>
+        </p:txBody>
+      </p:sp>
     </p:spTree>
     <p:extLst>
       <p:ext uri="{BB962C8B-B14F-4D97-AF65-F5344CB8AC3E}">
-        <p14:creationId xmlns:p14="http://schemas.microsoft.com/office/powerpoint/2010/main" val="2627817514"/>
+        <p14:creationId xmlns:p14="http://schemas.microsoft.com/office/powerpoint/2010/main" val="2068796493"/>
       </p:ext>
     </p:extLst>
   </p:cSld>
@@ -5433,6 +5608,102 @@
           <p:cNvPr id="2" name="Title 1">
             <a:extLst>
               <a:ext uri="{FF2B5EF4-FFF2-40B4-BE49-F238E27FC236}">
+                <a16:creationId xmlns:a16="http://schemas.microsoft.com/office/drawing/2014/main" id="{CA958870-9905-4901-B682-FE4BC661018F}"/>
+              </a:ext>
+            </a:extLst>
+          </p:cNvPr>
+          <p:cNvSpPr>
+            <a:spLocks noGrp="1"/>
+          </p:cNvSpPr>
+          <p:nvPr>
+            <p:ph type="title"/>
+          </p:nvPr>
+        </p:nvSpPr>
+        <p:spPr/>
+        <p:txBody>
+          <a:bodyPr/>
+          <a:lstStyle/>
+          <a:p>
+            <a:r>
+              <a:rPr lang="en-US" dirty="0"/>
+              <a:t>Procedure</a:t>
+            </a:r>
+            <a:br>
+              <a:rPr lang="en-US" dirty="0"/>
+            </a:br>
+            <a:r>
+              <a:rPr lang="en-US" sz="2800" dirty="0"/>
+              <a:t>Parts 1,2,3,4</a:t>
+            </a:r>
+            <a:endParaRPr lang="en-US" dirty="0"/>
+          </a:p>
+        </p:txBody>
+      </p:sp>
+      <p:pic>
+        <p:nvPicPr>
+          <p:cNvPr id="4" name="Picture 3">
+            <a:extLst>
+              <a:ext uri="{FF2B5EF4-FFF2-40B4-BE49-F238E27FC236}">
+                <a16:creationId xmlns:a16="http://schemas.microsoft.com/office/drawing/2014/main" id="{8FC50160-8816-4A6D-9E21-DC4F69F3B6E9}"/>
+              </a:ext>
+            </a:extLst>
+          </p:cNvPr>
+          <p:cNvPicPr>
+            <a:picLocks noChangeAspect="1"/>
+          </p:cNvPicPr>
+          <p:nvPr/>
+        </p:nvPicPr>
+        <p:blipFill>
+          <a:blip r:embed="rId2"/>
+          <a:stretch>
+            <a:fillRect/>
+          </a:stretch>
+        </p:blipFill>
+        <p:spPr>
+          <a:xfrm>
+            <a:off x="2281806" y="1682994"/>
+            <a:ext cx="8381713" cy="5031077"/>
+          </a:xfrm>
+          <a:prstGeom prst="rect">
+            <a:avLst/>
+          </a:prstGeom>
+        </p:spPr>
+      </p:pic>
+    </p:spTree>
+    <p:extLst>
+      <p:ext uri="{BB962C8B-B14F-4D97-AF65-F5344CB8AC3E}">
+        <p14:creationId xmlns:p14="http://schemas.microsoft.com/office/powerpoint/2010/main" val="1660321134"/>
+      </p:ext>
+    </p:extLst>
+  </p:cSld>
+  <p:clrMapOvr>
+    <a:masterClrMapping/>
+  </p:clrMapOvr>
+</p:sld>
+</file>
+
+<file path=ppt/slides/slide26.xml><?xml version="1.0" encoding="utf-8"?>
+<p:sld xmlns:a="http://schemas.openxmlformats.org/drawingml/2006/main" xmlns:r="http://schemas.openxmlformats.org/officeDocument/2006/relationships" xmlns:p="http://schemas.openxmlformats.org/presentationml/2006/main">
+  <p:cSld>
+    <p:spTree>
+      <p:nvGrpSpPr>
+        <p:cNvPr id="1" name=""/>
+        <p:cNvGrpSpPr/>
+        <p:nvPr/>
+      </p:nvGrpSpPr>
+      <p:grpSpPr>
+        <a:xfrm>
+          <a:off x="0" y="0"/>
+          <a:ext cx="0" cy="0"/>
+          <a:chOff x="0" y="0"/>
+          <a:chExt cx="0" cy="0"/>
+        </a:xfrm>
+      </p:grpSpPr>
+      <p:sp>
+        <p:nvSpPr>
+          <p:cNvPr id="2" name="Title 1">
+            <a:extLst>
+              <a:ext uri="{FF2B5EF4-FFF2-40B4-BE49-F238E27FC236}">
                 <a16:creationId xmlns:a16="http://schemas.microsoft.com/office/drawing/2014/main" id="{9664B4A8-4E24-45A9-B250-1BD4D180AF82}"/>
               </a:ext>
             </a:extLst>
@@ -5451,7 +5722,7 @@
           <a:p>
             <a:r>
               <a:rPr lang="en-US" dirty="0"/>
-              <a:t>split</a:t>
+              <a:t>Part 1: split</a:t>
             </a:r>
           </a:p>
         </p:txBody>
@@ -5499,7 +5770,7 @@
 </p:sld>
 </file>
 
-<file path=ppt/slides/slide26.xml><?xml version="1.0" encoding="utf-8"?>
+<file path=ppt/slides/slide27.xml><?xml version="1.0" encoding="utf-8"?>
 <p:sld xmlns:a="http://schemas.openxmlformats.org/drawingml/2006/main" xmlns:r="http://schemas.openxmlformats.org/officeDocument/2006/relationships" xmlns:p="http://schemas.openxmlformats.org/presentationml/2006/main">
   <p:cSld>
     <p:spTree>
@@ -5544,7 +5815,11 @@
           <a:p>
             <a:r>
               <a:rPr lang="en-US" dirty="0"/>
-              <a:t>calculate_features.py</a:t>
+              <a:t>Part 2: </a:t>
+            </a:r>
+            <a:r>
+              <a:rPr lang="en-US" dirty="0" err="1"/>
+              <a:t>calculate_features</a:t>
             </a:r>
             <a:br>
               <a:rPr lang="en-US" dirty="0"/>
@@ -5673,7 +5948,7 @@
 </p:sld>
 </file>
 
-<file path=ppt/slides/slide27.xml><?xml version="1.0" encoding="utf-8"?>
+<file path=ppt/slides/slide28.xml><?xml version="1.0" encoding="utf-8"?>
 <p:sld xmlns:a="http://schemas.openxmlformats.org/drawingml/2006/main" xmlns:r="http://schemas.openxmlformats.org/officeDocument/2006/relationships" xmlns:p="http://schemas.openxmlformats.org/presentationml/2006/main">
   <p:cSld>
     <p:spTree>
@@ -5720,10 +5995,10 @@
       </p:sp>
       <p:pic>
         <p:nvPicPr>
-          <p:cNvPr id="4" name="Picture 3">
-            <a:extLst>
-              <a:ext uri="{FF2B5EF4-FFF2-40B4-BE49-F238E27FC236}">
-                <a16:creationId xmlns:a16="http://schemas.microsoft.com/office/drawing/2014/main" id="{783B0F38-82DB-4176-BD15-D5770D2321F1}"/>
+          <p:cNvPr id="3" name="Picture 2">
+            <a:extLst>
+              <a:ext uri="{FF2B5EF4-FFF2-40B4-BE49-F238E27FC236}">
+                <a16:creationId xmlns:a16="http://schemas.microsoft.com/office/drawing/2014/main" id="{523F7082-DF1D-407B-BC51-8D880E0EAD3D}"/>
               </a:ext>
             </a:extLst>
           </p:cNvPr>
@@ -5740,8 +6015,8 @@
         </p:blipFill>
         <p:spPr>
           <a:xfrm>
-            <a:off x="95250" y="1964727"/>
-            <a:ext cx="12001500" cy="4086225"/>
+            <a:off x="104775" y="1381125"/>
+            <a:ext cx="11982450" cy="4095750"/>
           </a:xfrm>
           <a:prstGeom prst="rect">
             <a:avLst/>
@@ -5761,7 +6036,7 @@
 </p:sld>
 </file>
 
-<file path=ppt/slides/slide28.xml><?xml version="1.0" encoding="utf-8"?>
+<file path=ppt/slides/slide29.xml><?xml version="1.0" encoding="utf-8"?>
 <p:sld xmlns:a="http://schemas.openxmlformats.org/drawingml/2006/main" xmlns:r="http://schemas.openxmlformats.org/officeDocument/2006/relationships" xmlns:p="http://schemas.openxmlformats.org/presentationml/2006/main">
   <p:cSld>
     <p:spTree>
@@ -5808,10 +6083,10 @@
       </p:sp>
       <p:pic>
         <p:nvPicPr>
-          <p:cNvPr id="4" name="Picture 3">
-            <a:extLst>
-              <a:ext uri="{FF2B5EF4-FFF2-40B4-BE49-F238E27FC236}">
-                <a16:creationId xmlns:a16="http://schemas.microsoft.com/office/drawing/2014/main" id="{783B0F38-82DB-4176-BD15-D5770D2321F1}"/>
+          <p:cNvPr id="3" name="Picture 2">
+            <a:extLst>
+              <a:ext uri="{FF2B5EF4-FFF2-40B4-BE49-F238E27FC236}">
+                <a16:creationId xmlns:a16="http://schemas.microsoft.com/office/drawing/2014/main" id="{F7957003-6D98-42D7-8FBA-378573AFD4DA}"/>
               </a:ext>
             </a:extLst>
           </p:cNvPr>
@@ -5828,8 +6103,8 @@
         </p:blipFill>
         <p:spPr>
           <a:xfrm>
-            <a:off x="95250" y="2011380"/>
-            <a:ext cx="12001500" cy="4086225"/>
+            <a:off x="104775" y="1381125"/>
+            <a:ext cx="11982450" cy="4095750"/>
           </a:xfrm>
           <a:prstGeom prst="rect">
             <a:avLst/>
@@ -5850,7 +6125,7 @@
         </p:nvSpPr>
         <p:spPr>
           <a:xfrm>
-            <a:off x="5103844" y="2272345"/>
+            <a:off x="5075852" y="1848287"/>
             <a:ext cx="1110344" cy="3470988"/>
           </a:xfrm>
           <a:prstGeom prst="ellipse">
@@ -5891,164 +6166,6 @@
     <p:extLst>
       <p:ext uri="{BB962C8B-B14F-4D97-AF65-F5344CB8AC3E}">
         <p14:creationId xmlns:p14="http://schemas.microsoft.com/office/powerpoint/2010/main" val="239304970"/>
-      </p:ext>
-    </p:extLst>
-  </p:cSld>
-  <p:clrMapOvr>
-    <a:masterClrMapping/>
-  </p:clrMapOvr>
-</p:sld>
-</file>
-
-<file path=ppt/slides/slide29.xml><?xml version="1.0" encoding="utf-8"?>
-<p:sld xmlns:a="http://schemas.openxmlformats.org/drawingml/2006/main" xmlns:r="http://schemas.openxmlformats.org/officeDocument/2006/relationships" xmlns:p="http://schemas.openxmlformats.org/presentationml/2006/main">
-  <p:cSld>
-    <p:spTree>
-      <p:nvGrpSpPr>
-        <p:cNvPr id="1" name=""/>
-        <p:cNvGrpSpPr/>
-        <p:nvPr/>
-      </p:nvGrpSpPr>
-      <p:grpSpPr>
-        <a:xfrm>
-          <a:off x="0" y="0"/>
-          <a:ext cx="0" cy="0"/>
-          <a:chOff x="0" y="0"/>
-          <a:chExt cx="0" cy="0"/>
-        </a:xfrm>
-      </p:grpSpPr>
-      <p:sp>
-        <p:nvSpPr>
-          <p:cNvPr id="2" name="Title 1">
-            <a:extLst>
-              <a:ext uri="{FF2B5EF4-FFF2-40B4-BE49-F238E27FC236}">
-                <a16:creationId xmlns:a16="http://schemas.microsoft.com/office/drawing/2014/main" id="{17F9C7F3-AFF2-4D45-9224-C5A2A3052F54}"/>
-              </a:ext>
-            </a:extLst>
-          </p:cNvPr>
-          <p:cNvSpPr>
-            <a:spLocks noGrp="1"/>
-          </p:cNvSpPr>
-          <p:nvPr>
-            <p:ph type="title"/>
-          </p:nvPr>
-        </p:nvSpPr>
-        <p:spPr/>
-        <p:txBody>
-          <a:bodyPr/>
-          <a:lstStyle/>
-          <a:p>
-            <a:r>
-              <a:rPr lang="en-US" dirty="0"/>
-              <a:t>Normalize the flux</a:t>
-            </a:r>
-          </a:p>
-        </p:txBody>
-      </p:sp>
-      <p:sp>
-        <p:nvSpPr>
-          <p:cNvPr id="3" name="Content Placeholder 2">
-            <a:extLst>
-              <a:ext uri="{FF2B5EF4-FFF2-40B4-BE49-F238E27FC236}">
-                <a16:creationId xmlns:a16="http://schemas.microsoft.com/office/drawing/2014/main" id="{44AB7A6B-6FCD-47F5-81F6-175B2AAD5027}"/>
-              </a:ext>
-            </a:extLst>
-          </p:cNvPr>
-          <p:cNvSpPr>
-            <a:spLocks noGrp="1"/>
-          </p:cNvSpPr>
-          <p:nvPr>
-            <p:ph idx="1"/>
-          </p:nvPr>
-        </p:nvSpPr>
-        <p:spPr>
-          <a:xfrm>
-            <a:off x="838200" y="1690688"/>
-            <a:ext cx="8976919" cy="2452760"/>
-          </a:xfrm>
-        </p:spPr>
-        <p:txBody>
-          <a:bodyPr>
-            <a:normAutofit/>
-          </a:bodyPr>
-          <a:lstStyle/>
-          <a:p>
-            <a:pPr marL="0" indent="0">
-              <a:buNone/>
-            </a:pPr>
-            <a:r>
-              <a:rPr lang="en-US" sz="2000" dirty="0"/>
-              <a:t>For each [object, passband], calculate reductions mean and std</a:t>
-            </a:r>
-          </a:p>
-          <a:p>
-            <a:pPr marL="0" indent="0">
-              <a:buNone/>
-            </a:pPr>
-            <a:r>
-              <a:rPr lang="en-US" sz="2000" dirty="0"/>
-              <a:t>Use that to scale the flux (Bayes calculation)</a:t>
-            </a:r>
-          </a:p>
-          <a:p>
-            <a:pPr marL="0" indent="0">
-              <a:buNone/>
-            </a:pPr>
-            <a:r>
-              <a:rPr lang="en-US" sz="2000" dirty="0"/>
-              <a:t>Add “</a:t>
-            </a:r>
-            <a:r>
-              <a:rPr lang="en-US" sz="2000" dirty="0" err="1"/>
-              <a:t>bayes_flux</a:t>
-            </a:r>
-            <a:r>
-              <a:rPr lang="en-US" sz="2000" dirty="0"/>
-              <a:t>” as new feature to timeseries and overwrite “flux”</a:t>
-            </a:r>
-          </a:p>
-          <a:p>
-            <a:pPr marL="0" indent="0">
-              <a:buNone/>
-            </a:pPr>
-            <a:endParaRPr lang="en-US" sz="2000" dirty="0"/>
-          </a:p>
-        </p:txBody>
-      </p:sp>
-      <p:pic>
-        <p:nvPicPr>
-          <p:cNvPr id="4" name="Picture 3">
-            <a:extLst>
-              <a:ext uri="{FF2B5EF4-FFF2-40B4-BE49-F238E27FC236}">
-                <a16:creationId xmlns:a16="http://schemas.microsoft.com/office/drawing/2014/main" id="{EE8A5F0D-EEBC-47BE-A035-088D6670206B}"/>
-              </a:ext>
-            </a:extLst>
-          </p:cNvPr>
-          <p:cNvPicPr>
-            <a:picLocks noChangeAspect="1"/>
-          </p:cNvPicPr>
-          <p:nvPr/>
-        </p:nvPicPr>
-        <p:blipFill>
-          <a:blip r:embed="rId2"/>
-          <a:stretch>
-            <a:fillRect/>
-          </a:stretch>
-        </p:blipFill>
-        <p:spPr>
-          <a:xfrm>
-            <a:off x="1083970" y="3148901"/>
-            <a:ext cx="10418124" cy="2802272"/>
-          </a:xfrm>
-          <a:prstGeom prst="rect">
-            <a:avLst/>
-          </a:prstGeom>
-        </p:spPr>
-      </p:pic>
-    </p:spTree>
-    <p:extLst>
-      <p:ext uri="{BB962C8B-B14F-4D97-AF65-F5344CB8AC3E}">
-        <p14:creationId xmlns:p14="http://schemas.microsoft.com/office/powerpoint/2010/main" val="3909867018"/>
       </p:ext>
     </p:extLst>
   </p:cSld>
@@ -6728,6 +6845,164 @@
           <a:chExt cx="0" cy="0"/>
         </a:xfrm>
       </p:grpSpPr>
+      <p:sp>
+        <p:nvSpPr>
+          <p:cNvPr id="2" name="Title 1">
+            <a:extLst>
+              <a:ext uri="{FF2B5EF4-FFF2-40B4-BE49-F238E27FC236}">
+                <a16:creationId xmlns:a16="http://schemas.microsoft.com/office/drawing/2014/main" id="{17F9C7F3-AFF2-4D45-9224-C5A2A3052F54}"/>
+              </a:ext>
+            </a:extLst>
+          </p:cNvPr>
+          <p:cNvSpPr>
+            <a:spLocks noGrp="1"/>
+          </p:cNvSpPr>
+          <p:nvPr>
+            <p:ph type="title"/>
+          </p:nvPr>
+        </p:nvSpPr>
+        <p:spPr/>
+        <p:txBody>
+          <a:bodyPr/>
+          <a:lstStyle/>
+          <a:p>
+            <a:r>
+              <a:rPr lang="en-US" dirty="0"/>
+              <a:t>Normalize the flux</a:t>
+            </a:r>
+          </a:p>
+        </p:txBody>
+      </p:sp>
+      <p:sp>
+        <p:nvSpPr>
+          <p:cNvPr id="3" name="Content Placeholder 2">
+            <a:extLst>
+              <a:ext uri="{FF2B5EF4-FFF2-40B4-BE49-F238E27FC236}">
+                <a16:creationId xmlns:a16="http://schemas.microsoft.com/office/drawing/2014/main" id="{44AB7A6B-6FCD-47F5-81F6-175B2AAD5027}"/>
+              </a:ext>
+            </a:extLst>
+          </p:cNvPr>
+          <p:cNvSpPr>
+            <a:spLocks noGrp="1"/>
+          </p:cNvSpPr>
+          <p:nvPr>
+            <p:ph idx="1"/>
+          </p:nvPr>
+        </p:nvSpPr>
+        <p:spPr>
+          <a:xfrm>
+            <a:off x="838200" y="1690688"/>
+            <a:ext cx="8976919" cy="2452760"/>
+          </a:xfrm>
+        </p:spPr>
+        <p:txBody>
+          <a:bodyPr>
+            <a:normAutofit/>
+          </a:bodyPr>
+          <a:lstStyle/>
+          <a:p>
+            <a:pPr marL="0" indent="0">
+              <a:buNone/>
+            </a:pPr>
+            <a:r>
+              <a:rPr lang="en-US" sz="2000" dirty="0"/>
+              <a:t>For each [object, passband], calculate reductions mean and std</a:t>
+            </a:r>
+          </a:p>
+          <a:p>
+            <a:pPr marL="0" indent="0">
+              <a:buNone/>
+            </a:pPr>
+            <a:r>
+              <a:rPr lang="en-US" sz="2000" dirty="0"/>
+              <a:t>Use that to scale the flux (Bayes calculation)</a:t>
+            </a:r>
+          </a:p>
+          <a:p>
+            <a:pPr marL="0" indent="0">
+              <a:buNone/>
+            </a:pPr>
+            <a:r>
+              <a:rPr lang="en-US" sz="2000" dirty="0"/>
+              <a:t>Add “</a:t>
+            </a:r>
+            <a:r>
+              <a:rPr lang="en-US" sz="2000" dirty="0" err="1"/>
+              <a:t>bayes_flux</a:t>
+            </a:r>
+            <a:r>
+              <a:rPr lang="en-US" sz="2000" dirty="0"/>
+              <a:t>” as new feature to timeseries and overwrite “flux”</a:t>
+            </a:r>
+          </a:p>
+          <a:p>
+            <a:pPr marL="0" indent="0">
+              <a:buNone/>
+            </a:pPr>
+            <a:endParaRPr lang="en-US" sz="2000" dirty="0"/>
+          </a:p>
+        </p:txBody>
+      </p:sp>
+      <p:pic>
+        <p:nvPicPr>
+          <p:cNvPr id="4" name="Picture 3">
+            <a:extLst>
+              <a:ext uri="{FF2B5EF4-FFF2-40B4-BE49-F238E27FC236}">
+                <a16:creationId xmlns:a16="http://schemas.microsoft.com/office/drawing/2014/main" id="{EE8A5F0D-EEBC-47BE-A035-088D6670206B}"/>
+              </a:ext>
+            </a:extLst>
+          </p:cNvPr>
+          <p:cNvPicPr>
+            <a:picLocks noChangeAspect="1"/>
+          </p:cNvPicPr>
+          <p:nvPr/>
+        </p:nvPicPr>
+        <p:blipFill>
+          <a:blip r:embed="rId2"/>
+          <a:stretch>
+            <a:fillRect/>
+          </a:stretch>
+        </p:blipFill>
+        <p:spPr>
+          <a:xfrm>
+            <a:off x="1083970" y="3148901"/>
+            <a:ext cx="10418124" cy="2802272"/>
+          </a:xfrm>
+          <a:prstGeom prst="rect">
+            <a:avLst/>
+          </a:prstGeom>
+        </p:spPr>
+      </p:pic>
+    </p:spTree>
+    <p:extLst>
+      <p:ext uri="{BB962C8B-B14F-4D97-AF65-F5344CB8AC3E}">
+        <p14:creationId xmlns:p14="http://schemas.microsoft.com/office/powerpoint/2010/main" val="3909867018"/>
+      </p:ext>
+    </p:extLst>
+  </p:cSld>
+  <p:clrMapOvr>
+    <a:masterClrMapping/>
+  </p:clrMapOvr>
+</p:sld>
+</file>
+
+<file path=ppt/slides/slide31.xml><?xml version="1.0" encoding="utf-8"?>
+<p:sld xmlns:a="http://schemas.openxmlformats.org/drawingml/2006/main" xmlns:r="http://schemas.openxmlformats.org/officeDocument/2006/relationships" xmlns:p="http://schemas.openxmlformats.org/presentationml/2006/main">
+  <p:cSld>
+    <p:spTree>
+      <p:nvGrpSpPr>
+        <p:cNvPr id="1" name=""/>
+        <p:cNvGrpSpPr/>
+        <p:nvPr/>
+      </p:nvGrpSpPr>
+      <p:grpSpPr>
+        <a:xfrm>
+          <a:off x="0" y="0"/>
+          <a:ext cx="0" cy="0"/>
+          <a:chOff x="0" y="0"/>
+          <a:chExt cx="0" cy="0"/>
+        </a:xfrm>
+      </p:grpSpPr>
       <p:pic>
         <p:nvPicPr>
           <p:cNvPr id="7" name="Picture 6">
@@ -6771,7 +7046,7 @@
 </p:sld>
 </file>
 
-<file path=ppt/slides/slide31.xml><?xml version="1.0" encoding="utf-8"?>
+<file path=ppt/slides/slide32.xml><?xml version="1.0" encoding="utf-8"?>
 <p:sld xmlns:a="http://schemas.openxmlformats.org/drawingml/2006/main" xmlns:r="http://schemas.openxmlformats.org/officeDocument/2006/relationships" xmlns:p="http://schemas.openxmlformats.org/presentationml/2006/main">
   <p:cSld>
     <p:spTree>
@@ -7073,7 +7348,7 @@
 </p:sld>
 </file>
 
-<file path=ppt/slides/slide32.xml><?xml version="1.0" encoding="utf-8"?>
+<file path=ppt/slides/slide33.xml><?xml version="1.0" encoding="utf-8"?>
 <p:sld xmlns:a="http://schemas.openxmlformats.org/drawingml/2006/main" xmlns:r="http://schemas.openxmlformats.org/officeDocument/2006/relationships" xmlns:p="http://schemas.openxmlformats.org/presentationml/2006/main">
   <p:cSld>
     <p:spTree>
@@ -7221,7 +7496,7 @@
 </p:sld>
 </file>
 
-<file path=ppt/slides/slide33.xml><?xml version="1.0" encoding="utf-8"?>
+<file path=ppt/slides/slide34.xml><?xml version="1.0" encoding="utf-8"?>
 <p:sld xmlns:a="http://schemas.openxmlformats.org/drawingml/2006/main" xmlns:r="http://schemas.openxmlformats.org/officeDocument/2006/relationships" xmlns:p="http://schemas.openxmlformats.org/presentationml/2006/main">
   <p:cSld>
     <p:spTree>
@@ -7281,7 +7556,7 @@
 </p:sld>
 </file>
 
-<file path=ppt/slides/slide34.xml><?xml version="1.0" encoding="utf-8"?>
+<file path=ppt/slides/slide35.xml><?xml version="1.0" encoding="utf-8"?>
 <p:sld xmlns:a="http://schemas.openxmlformats.org/drawingml/2006/main" xmlns:r="http://schemas.openxmlformats.org/officeDocument/2006/relationships" xmlns:p="http://schemas.openxmlformats.org/presentationml/2006/main">
   <p:cSld>
     <p:spTree>
@@ -7475,7 +7750,7 @@
 </p:sld>
 </file>
 
-<file path=ppt/slides/slide35.xml><?xml version="1.0" encoding="utf-8"?>
+<file path=ppt/slides/slide36.xml><?xml version="1.0" encoding="utf-8"?>
 <p:sld xmlns:a="http://schemas.openxmlformats.org/drawingml/2006/main" xmlns:r="http://schemas.openxmlformats.org/officeDocument/2006/relationships" xmlns:p="http://schemas.openxmlformats.org/presentationml/2006/main">
   <p:cSld>
     <p:spTree>
@@ -7805,7 +8080,7 @@
 </p:sld>
 </file>
 
-<file path=ppt/slides/slide36.xml><?xml version="1.0" encoding="utf-8"?>
+<file path=ppt/slides/slide37.xml><?xml version="1.0" encoding="utf-8"?>
 <p:sld xmlns:a="http://schemas.openxmlformats.org/drawingml/2006/main" xmlns:r="http://schemas.openxmlformats.org/officeDocument/2006/relationships" xmlns:p="http://schemas.openxmlformats.org/presentationml/2006/main">
   <p:cSld>
     <p:spTree>
@@ -7865,7 +8140,7 @@
 </p:sld>
 </file>
 
-<file path=ppt/slides/slide37.xml><?xml version="1.0" encoding="utf-8"?>
+<file path=ppt/slides/slide38.xml><?xml version="1.0" encoding="utf-8"?>
 <p:sld xmlns:a="http://schemas.openxmlformats.org/drawingml/2006/main" xmlns:r="http://schemas.openxmlformats.org/officeDocument/2006/relationships" xmlns:p="http://schemas.openxmlformats.org/presentationml/2006/main">
   <p:cSld>
     <p:spTree>
@@ -8065,148 +8340,6 @@
     <p:extLst>
       <p:ext uri="{BB962C8B-B14F-4D97-AF65-F5344CB8AC3E}">
         <p14:creationId xmlns:p14="http://schemas.microsoft.com/office/powerpoint/2010/main" val="2226198166"/>
-      </p:ext>
-    </p:extLst>
-  </p:cSld>
-  <p:clrMapOvr>
-    <a:masterClrMapping/>
-  </p:clrMapOvr>
-</p:sld>
-</file>
-
-<file path=ppt/slides/slide38.xml><?xml version="1.0" encoding="utf-8"?>
-<p:sld xmlns:a="http://schemas.openxmlformats.org/drawingml/2006/main" xmlns:r="http://schemas.openxmlformats.org/officeDocument/2006/relationships" xmlns:p="http://schemas.openxmlformats.org/presentationml/2006/main">
-  <p:cSld>
-    <p:spTree>
-      <p:nvGrpSpPr>
-        <p:cNvPr id="1" name=""/>
-        <p:cNvGrpSpPr/>
-        <p:nvPr/>
-      </p:nvGrpSpPr>
-      <p:grpSpPr>
-        <a:xfrm>
-          <a:off x="0" y="0"/>
-          <a:ext cx="0" cy="0"/>
-          <a:chOff x="0" y="0"/>
-          <a:chExt cx="0" cy="0"/>
-        </a:xfrm>
-      </p:grpSpPr>
-      <p:sp>
-        <p:nvSpPr>
-          <p:cNvPr id="2" name="Title 1">
-            <a:extLst>
-              <a:ext uri="{FF2B5EF4-FFF2-40B4-BE49-F238E27FC236}">
-                <a16:creationId xmlns:a16="http://schemas.microsoft.com/office/drawing/2014/main" id="{5E2003B7-4F54-4E28-BE79-881FFE04F263}"/>
-              </a:ext>
-            </a:extLst>
-          </p:cNvPr>
-          <p:cNvSpPr>
-            <a:spLocks noGrp="1"/>
-          </p:cNvSpPr>
-          <p:nvPr>
-            <p:ph type="title"/>
-          </p:nvPr>
-        </p:nvSpPr>
-        <p:spPr/>
-        <p:txBody>
-          <a:bodyPr/>
-          <a:lstStyle/>
-          <a:p>
-            <a:r>
-              <a:rPr lang="en-US" dirty="0"/>
-              <a:t>“</a:t>
-            </a:r>
-            <a:r>
-              <a:rPr lang="en-US" dirty="0" err="1"/>
-              <a:t>most_extreme</a:t>
-            </a:r>
-            <a:r>
-              <a:rPr lang="en-US" dirty="0"/>
-              <a:t>()”</a:t>
-            </a:r>
-          </a:p>
-        </p:txBody>
-      </p:sp>
-      <p:sp>
-        <p:nvSpPr>
-          <p:cNvPr id="3" name="Content Placeholder 2">
-            <a:extLst>
-              <a:ext uri="{FF2B5EF4-FFF2-40B4-BE49-F238E27FC236}">
-                <a16:creationId xmlns:a16="http://schemas.microsoft.com/office/drawing/2014/main" id="{11181497-7A72-4CBD-A495-7D7D5E2A4569}"/>
-              </a:ext>
-            </a:extLst>
-          </p:cNvPr>
-          <p:cNvSpPr>
-            <a:spLocks noGrp="1"/>
-          </p:cNvSpPr>
-          <p:nvPr>
-            <p:ph idx="1"/>
-          </p:nvPr>
-        </p:nvSpPr>
-        <p:spPr/>
-        <p:txBody>
-          <a:bodyPr>
-            <a:normAutofit/>
-          </a:bodyPr>
-          <a:lstStyle/>
-          <a:p>
-            <a:r>
-              <a:rPr lang="en-US" dirty="0"/>
-              <a:t>Find the "most extreme" time for each object and each band</a:t>
-            </a:r>
-          </a:p>
-          <a:p>
-            <a:r>
-              <a:rPr lang="en-US" dirty="0"/>
-              <a:t>Retrieve the k data points on either side</a:t>
-            </a:r>
-          </a:p>
-          <a:p>
-            <a:endParaRPr lang="en-US" dirty="0"/>
-          </a:p>
-          <a:p>
-            <a:r>
-              <a:rPr lang="en-US" dirty="0"/>
-              <a:t>Procedure:</a:t>
-            </a:r>
-          </a:p>
-          <a:p>
-            <a:pPr lvl="1"/>
-            <a:r>
-              <a:rPr lang="en-US" dirty="0"/>
-              <a:t>for each passband - translate to it's median</a:t>
-            </a:r>
-          </a:p>
-          <a:p>
-            <a:pPr lvl="1"/>
-            <a:r>
-              <a:rPr lang="en-US" dirty="0"/>
-              <a:t>find the date of the peak (largest value)</a:t>
-            </a:r>
-          </a:p>
-          <a:p>
-            <a:pPr lvl="1"/>
-            <a:r>
-              <a:rPr lang="en-US" dirty="0"/>
-              <a:t>for each sample identify the number of days to/from the peak</a:t>
-            </a:r>
-          </a:p>
-          <a:p>
-            <a:pPr lvl="1"/>
-            <a:r>
-              <a:rPr lang="en-US" dirty="0"/>
-              <a:t>sort by days before/after in order to find the n preceding, and n following</a:t>
-            </a:r>
-          </a:p>
-          <a:p>
-            <a:endParaRPr lang="en-US" dirty="0"/>
-          </a:p>
-        </p:txBody>
-      </p:sp>
-    </p:spTree>
-    <p:extLst>
-      <p:ext uri="{BB962C8B-B14F-4D97-AF65-F5344CB8AC3E}">
-        <p14:creationId xmlns:p14="http://schemas.microsoft.com/office/powerpoint/2010/main" val="2074710726"/>
       </p:ext>
     </p:extLst>
   </p:cSld>
@@ -8238,7 +8371,7 @@
           <p:cNvPr id="2" name="Title 1">
             <a:extLst>
               <a:ext uri="{FF2B5EF4-FFF2-40B4-BE49-F238E27FC236}">
-                <a16:creationId xmlns:a16="http://schemas.microsoft.com/office/drawing/2014/main" id="{C330B598-59E4-4AD8-82D0-5E57E9C722C2}"/>
+                <a16:creationId xmlns:a16="http://schemas.microsoft.com/office/drawing/2014/main" id="{5E2003B7-4F54-4E28-BE79-881FFE04F263}"/>
               </a:ext>
             </a:extLst>
           </p:cNvPr>
@@ -8254,59 +8387,101 @@
           <a:bodyPr/>
           <a:lstStyle/>
           <a:p>
+            <a:r>
+              <a:rPr lang="en-US" dirty="0"/>
+              <a:t>“</a:t>
+            </a:r>
             <a:r>
               <a:rPr lang="en-US" dirty="0" err="1"/>
               <a:t>most_extreme</a:t>
             </a:r>
             <a:r>
               <a:rPr lang="en-US" dirty="0"/>
-              <a:t>  (1)</a:t>
-            </a:r>
-            <a:br>
-              <a:rPr lang="en-US" dirty="0"/>
-            </a:br>
-            <a:r>
-              <a:rPr lang="en-US" sz="2800" dirty="0"/>
-              <a:t>find the max value</a:t>
-            </a:r>
+              <a:t>()”</a:t>
+            </a:r>
+          </a:p>
+        </p:txBody>
+      </p:sp>
+      <p:sp>
+        <p:nvSpPr>
+          <p:cNvPr id="3" name="Content Placeholder 2">
+            <a:extLst>
+              <a:ext uri="{FF2B5EF4-FFF2-40B4-BE49-F238E27FC236}">
+                <a16:creationId xmlns:a16="http://schemas.microsoft.com/office/drawing/2014/main" id="{11181497-7A72-4CBD-A495-7D7D5E2A4569}"/>
+              </a:ext>
+            </a:extLst>
+          </p:cNvPr>
+          <p:cNvSpPr>
+            <a:spLocks noGrp="1"/>
+          </p:cNvSpPr>
+          <p:nvPr>
+            <p:ph idx="1"/>
+          </p:nvPr>
+        </p:nvSpPr>
+        <p:spPr/>
+        <p:txBody>
+          <a:bodyPr>
+            <a:normAutofit/>
+          </a:bodyPr>
+          <a:lstStyle/>
+          <a:p>
+            <a:r>
+              <a:rPr lang="en-US" dirty="0"/>
+              <a:t>Find the "most extreme" time for each object and each band</a:t>
+            </a:r>
+          </a:p>
+          <a:p>
+            <a:r>
+              <a:rPr lang="en-US" dirty="0"/>
+              <a:t>Retrieve the k data points on either side</a:t>
+            </a:r>
+          </a:p>
+          <a:p>
             <a:endParaRPr lang="en-US" dirty="0"/>
           </a:p>
-        </p:txBody>
-      </p:sp>
-      <p:pic>
-        <p:nvPicPr>
-          <p:cNvPr id="6" name="Picture 5">
-            <a:extLst>
-              <a:ext uri="{FF2B5EF4-FFF2-40B4-BE49-F238E27FC236}">
-                <a16:creationId xmlns:a16="http://schemas.microsoft.com/office/drawing/2014/main" id="{529F2B6B-59D2-4F9B-BECA-CC77F4F6B18C}"/>
-              </a:ext>
-            </a:extLst>
-          </p:cNvPr>
-          <p:cNvPicPr>
-            <a:picLocks noChangeAspect="1"/>
-          </p:cNvPicPr>
-          <p:nvPr/>
-        </p:nvPicPr>
-        <p:blipFill>
-          <a:blip r:embed="rId2"/>
-          <a:stretch>
-            <a:fillRect/>
-          </a:stretch>
-        </p:blipFill>
-        <p:spPr>
-          <a:xfrm>
-            <a:off x="709613" y="1690688"/>
-            <a:ext cx="11272208" cy="4953393"/>
-          </a:xfrm>
-          <a:prstGeom prst="rect">
-            <a:avLst/>
-          </a:prstGeom>
-        </p:spPr>
-      </p:pic>
+          <a:p>
+            <a:r>
+              <a:rPr lang="en-US" dirty="0"/>
+              <a:t>Procedure:</a:t>
+            </a:r>
+          </a:p>
+          <a:p>
+            <a:pPr lvl="1"/>
+            <a:r>
+              <a:rPr lang="en-US" dirty="0"/>
+              <a:t>for each passband - translate to it's median</a:t>
+            </a:r>
+          </a:p>
+          <a:p>
+            <a:pPr lvl="1"/>
+            <a:r>
+              <a:rPr lang="en-US" dirty="0"/>
+              <a:t>find the date of the peak (largest value)</a:t>
+            </a:r>
+          </a:p>
+          <a:p>
+            <a:pPr lvl="1"/>
+            <a:r>
+              <a:rPr lang="en-US" dirty="0"/>
+              <a:t>for each sample identify the number of days to/from the peak</a:t>
+            </a:r>
+          </a:p>
+          <a:p>
+            <a:pPr lvl="1"/>
+            <a:r>
+              <a:rPr lang="en-US" dirty="0"/>
+              <a:t>sort by days before/after in order to find the n preceding, and n following</a:t>
+            </a:r>
+          </a:p>
+          <a:p>
+            <a:endParaRPr lang="en-US" dirty="0"/>
+          </a:p>
+        </p:txBody>
+      </p:sp>
     </p:spTree>
     <p:extLst>
       <p:ext uri="{BB962C8B-B14F-4D97-AF65-F5344CB8AC3E}">
-        <p14:creationId xmlns:p14="http://schemas.microsoft.com/office/powerpoint/2010/main" val="3596977611"/>
+        <p14:creationId xmlns:p14="http://schemas.microsoft.com/office/powerpoint/2010/main" val="2074710726"/>
       </p:ext>
     </p:extLst>
   </p:cSld>
@@ -8529,6 +8704,106 @@
           <p:cNvPr id="2" name="Title 1">
             <a:extLst>
               <a:ext uri="{FF2B5EF4-FFF2-40B4-BE49-F238E27FC236}">
+                <a16:creationId xmlns:a16="http://schemas.microsoft.com/office/drawing/2014/main" id="{C330B598-59E4-4AD8-82D0-5E57E9C722C2}"/>
+              </a:ext>
+            </a:extLst>
+          </p:cNvPr>
+          <p:cNvSpPr>
+            <a:spLocks noGrp="1"/>
+          </p:cNvSpPr>
+          <p:nvPr>
+            <p:ph type="title"/>
+          </p:nvPr>
+        </p:nvSpPr>
+        <p:spPr/>
+        <p:txBody>
+          <a:bodyPr/>
+          <a:lstStyle/>
+          <a:p>
+            <a:r>
+              <a:rPr lang="en-US" dirty="0" err="1"/>
+              <a:t>most_extreme</a:t>
+            </a:r>
+            <a:r>
+              <a:rPr lang="en-US" dirty="0"/>
+              <a:t>  (1)</a:t>
+            </a:r>
+            <a:br>
+              <a:rPr lang="en-US" dirty="0"/>
+            </a:br>
+            <a:r>
+              <a:rPr lang="en-US" sz="2800" dirty="0"/>
+              <a:t>find the max value</a:t>
+            </a:r>
+            <a:endParaRPr lang="en-US" dirty="0"/>
+          </a:p>
+        </p:txBody>
+      </p:sp>
+      <p:pic>
+        <p:nvPicPr>
+          <p:cNvPr id="6" name="Picture 5">
+            <a:extLst>
+              <a:ext uri="{FF2B5EF4-FFF2-40B4-BE49-F238E27FC236}">
+                <a16:creationId xmlns:a16="http://schemas.microsoft.com/office/drawing/2014/main" id="{529F2B6B-59D2-4F9B-BECA-CC77F4F6B18C}"/>
+              </a:ext>
+            </a:extLst>
+          </p:cNvPr>
+          <p:cNvPicPr>
+            <a:picLocks noChangeAspect="1"/>
+          </p:cNvPicPr>
+          <p:nvPr/>
+        </p:nvPicPr>
+        <p:blipFill>
+          <a:blip r:embed="rId2"/>
+          <a:stretch>
+            <a:fillRect/>
+          </a:stretch>
+        </p:blipFill>
+        <p:spPr>
+          <a:xfrm>
+            <a:off x="709613" y="1690688"/>
+            <a:ext cx="11272208" cy="4953393"/>
+          </a:xfrm>
+          <a:prstGeom prst="rect">
+            <a:avLst/>
+          </a:prstGeom>
+        </p:spPr>
+      </p:pic>
+    </p:spTree>
+    <p:extLst>
+      <p:ext uri="{BB962C8B-B14F-4D97-AF65-F5344CB8AC3E}">
+        <p14:creationId xmlns:p14="http://schemas.microsoft.com/office/powerpoint/2010/main" val="3596977611"/>
+      </p:ext>
+    </p:extLst>
+  </p:cSld>
+  <p:clrMapOvr>
+    <a:masterClrMapping/>
+  </p:clrMapOvr>
+</p:sld>
+</file>
+
+<file path=ppt/slides/slide41.xml><?xml version="1.0" encoding="utf-8"?>
+<p:sld xmlns:a="http://schemas.openxmlformats.org/drawingml/2006/main" xmlns:r="http://schemas.openxmlformats.org/officeDocument/2006/relationships" xmlns:p="http://schemas.openxmlformats.org/presentationml/2006/main">
+  <p:cSld>
+    <p:spTree>
+      <p:nvGrpSpPr>
+        <p:cNvPr id="1" name=""/>
+        <p:cNvGrpSpPr/>
+        <p:nvPr/>
+      </p:nvGrpSpPr>
+      <p:grpSpPr>
+        <a:xfrm>
+          <a:off x="0" y="0"/>
+          <a:ext cx="0" cy="0"/>
+          <a:chOff x="0" y="0"/>
+          <a:chExt cx="0" cy="0"/>
+        </a:xfrm>
+      </p:grpSpPr>
+      <p:sp>
+        <p:nvSpPr>
+          <p:cNvPr id="2" name="Title 1">
+            <a:extLst>
+              <a:ext uri="{FF2B5EF4-FFF2-40B4-BE49-F238E27FC236}">
                 <a16:creationId xmlns:a16="http://schemas.microsoft.com/office/drawing/2014/main" id="{5ECC9989-E263-43B6-92ED-CE483AECA05E}"/>
               </a:ext>
             </a:extLst>
@@ -8611,7 +8886,7 @@
 </p:sld>
 </file>
 
-<file path=ppt/slides/slide41.xml><?xml version="1.0" encoding="utf-8"?>
+<file path=ppt/slides/slide42.xml><?xml version="1.0" encoding="utf-8"?>
 <p:sld xmlns:a="http://schemas.openxmlformats.org/drawingml/2006/main" xmlns:r="http://schemas.openxmlformats.org/officeDocument/2006/relationships" xmlns:p="http://schemas.openxmlformats.org/presentationml/2006/main">
   <p:cSld>
     <p:spTree>
@@ -8717,7 +8992,7 @@
 </p:sld>
 </file>
 
-<file path=ppt/slides/slide42.xml><?xml version="1.0" encoding="utf-8"?>
+<file path=ppt/slides/slide43.xml><?xml version="1.0" encoding="utf-8"?>
 <p:sld xmlns:a="http://schemas.openxmlformats.org/drawingml/2006/main" xmlns:r="http://schemas.openxmlformats.org/officeDocument/2006/relationships" xmlns:p="http://schemas.openxmlformats.org/presentationml/2006/main">
   <p:cSld>
     <p:spTree>
@@ -8847,7 +9122,7 @@
 </p:sld>
 </file>
 
-<file path=ppt/slides/slide43.xml><?xml version="1.0" encoding="utf-8"?>
+<file path=ppt/slides/slide44.xml><?xml version="1.0" encoding="utf-8"?>
 <p:sld xmlns:a="http://schemas.openxmlformats.org/drawingml/2006/main" xmlns:r="http://schemas.openxmlformats.org/officeDocument/2006/relationships" xmlns:p="http://schemas.openxmlformats.org/presentationml/2006/main">
   <p:cSld>
     <p:spTree>
@@ -8869,6 +9144,486 @@
           <p:cNvPr id="2" name="Title 1">
             <a:extLst>
               <a:ext uri="{FF2B5EF4-FFF2-40B4-BE49-F238E27FC236}">
+                <a16:creationId xmlns:a16="http://schemas.microsoft.com/office/drawing/2014/main" id="{CA958870-9905-4901-B682-FE4BC661018F}"/>
+              </a:ext>
+            </a:extLst>
+          </p:cNvPr>
+          <p:cNvSpPr>
+            <a:spLocks noGrp="1"/>
+          </p:cNvSpPr>
+          <p:nvPr>
+            <p:ph type="title"/>
+          </p:nvPr>
+        </p:nvSpPr>
+        <p:spPr>
+          <a:xfrm>
+            <a:off x="838200" y="365125"/>
+            <a:ext cx="10515600" cy="1006475"/>
+          </a:xfrm>
+        </p:spPr>
+        <p:txBody>
+          <a:bodyPr>
+            <a:normAutofit/>
+          </a:bodyPr>
+          <a:lstStyle/>
+          <a:p>
+            <a:r>
+              <a:rPr lang="en-US" dirty="0"/>
+              <a:t>Where we are...</a:t>
+            </a:r>
+            <a:br>
+              <a:rPr lang="en-US" dirty="0"/>
+            </a:br>
+            <a:r>
+              <a:rPr lang="en-US" sz="2200" dirty="0"/>
+              <a:t>We engineered features.  Now create model using LGB.</a:t>
+            </a:r>
+            <a:endParaRPr lang="en-US" dirty="0"/>
+          </a:p>
+        </p:txBody>
+      </p:sp>
+      <p:pic>
+        <p:nvPicPr>
+          <p:cNvPr id="3" name="Picture 2">
+            <a:extLst>
+              <a:ext uri="{FF2B5EF4-FFF2-40B4-BE49-F238E27FC236}">
+                <a16:creationId xmlns:a16="http://schemas.microsoft.com/office/drawing/2014/main" id="{C6B49D17-11CE-4FF1-A924-8393D6F19560}"/>
+              </a:ext>
+            </a:extLst>
+          </p:cNvPr>
+          <p:cNvPicPr>
+            <a:picLocks noChangeAspect="1"/>
+          </p:cNvPicPr>
+          <p:nvPr/>
+        </p:nvPicPr>
+        <p:blipFill>
+          <a:blip r:embed="rId2"/>
+          <a:stretch>
+            <a:fillRect/>
+          </a:stretch>
+        </p:blipFill>
+        <p:spPr>
+          <a:xfrm>
+            <a:off x="2286000" y="1656268"/>
+            <a:ext cx="8485898" cy="5086694"/>
+          </a:xfrm>
+          <a:prstGeom prst="rect">
+            <a:avLst/>
+          </a:prstGeom>
+        </p:spPr>
+      </p:pic>
+    </p:spTree>
+    <p:extLst>
+      <p:ext uri="{BB962C8B-B14F-4D97-AF65-F5344CB8AC3E}">
+        <p14:creationId xmlns:p14="http://schemas.microsoft.com/office/powerpoint/2010/main" val="2991060506"/>
+      </p:ext>
+    </p:extLst>
+  </p:cSld>
+  <p:clrMapOvr>
+    <a:masterClrMapping/>
+  </p:clrMapOvr>
+</p:sld>
+</file>
+
+<file path=ppt/slides/slide45.xml><?xml version="1.0" encoding="utf-8"?>
+<p:sld xmlns:a="http://schemas.openxmlformats.org/drawingml/2006/main" xmlns:r="http://schemas.openxmlformats.org/officeDocument/2006/relationships" xmlns:p="http://schemas.openxmlformats.org/presentationml/2006/main">
+  <p:cSld>
+    <p:spTree>
+      <p:nvGrpSpPr>
+        <p:cNvPr id="1" name=""/>
+        <p:cNvGrpSpPr/>
+        <p:nvPr/>
+      </p:nvGrpSpPr>
+      <p:grpSpPr>
+        <a:xfrm>
+          <a:off x="0" y="0"/>
+          <a:ext cx="0" cy="0"/>
+          <a:chOff x="0" y="0"/>
+          <a:chExt cx="0" cy="0"/>
+        </a:xfrm>
+      </p:grpSpPr>
+      <p:sp>
+        <p:nvSpPr>
+          <p:cNvPr id="2" name="Title 1">
+            <a:extLst>
+              <a:ext uri="{FF2B5EF4-FFF2-40B4-BE49-F238E27FC236}">
+                <a16:creationId xmlns:a16="http://schemas.microsoft.com/office/drawing/2014/main" id="{04D85945-7F67-4CE4-86F3-D2D086C59488}"/>
+              </a:ext>
+            </a:extLst>
+          </p:cNvPr>
+          <p:cNvSpPr>
+            <a:spLocks noGrp="1"/>
+          </p:cNvSpPr>
+          <p:nvPr>
+            <p:ph type="title"/>
+          </p:nvPr>
+        </p:nvSpPr>
+        <p:spPr/>
+        <p:txBody>
+          <a:bodyPr/>
+          <a:lstStyle/>
+          <a:p>
+            <a:r>
+              <a:rPr lang="en-US" dirty="0"/>
+              <a:t>Part 3: Train, Validate, Predict</a:t>
+            </a:r>
+            <a:br>
+              <a:rPr lang="en-US" dirty="0"/>
+            </a:br>
+            <a:r>
+              <a:rPr lang="en-US" sz="2400" dirty="0"/>
+              <a:t>(predict.py)</a:t>
+            </a:r>
+            <a:endParaRPr lang="en-US" dirty="0"/>
+          </a:p>
+        </p:txBody>
+      </p:sp>
+      <p:sp>
+        <p:nvSpPr>
+          <p:cNvPr id="3" name="Content Placeholder 2">
+            <a:extLst>
+              <a:ext uri="{FF2B5EF4-FFF2-40B4-BE49-F238E27FC236}">
+                <a16:creationId xmlns:a16="http://schemas.microsoft.com/office/drawing/2014/main" id="{23606B2C-2C02-42AD-99F8-D913477CC06C}"/>
+              </a:ext>
+            </a:extLst>
+          </p:cNvPr>
+          <p:cNvSpPr>
+            <a:spLocks noGrp="1"/>
+          </p:cNvSpPr>
+          <p:nvPr>
+            <p:ph idx="1"/>
+          </p:nvPr>
+        </p:nvSpPr>
+        <p:spPr/>
+        <p:txBody>
+          <a:bodyPr>
+            <a:normAutofit/>
+          </a:bodyPr>
+          <a:lstStyle/>
+          <a:p>
+            <a:r>
+              <a:rPr lang="en-US" dirty="0"/>
+              <a:t>This is where we:</a:t>
+            </a:r>
+          </a:p>
+          <a:p>
+            <a:pPr lvl="1"/>
+            <a:r>
+              <a:rPr lang="en-US" dirty="0"/>
+              <a:t>Train</a:t>
+            </a:r>
+          </a:p>
+          <a:p>
+            <a:pPr lvl="1"/>
+            <a:r>
+              <a:rPr lang="en-US" dirty="0"/>
+              <a:t>Validate</a:t>
+            </a:r>
+          </a:p>
+          <a:p>
+            <a:pPr lvl="1"/>
+            <a:r>
+              <a:rPr lang="en-US" dirty="0"/>
+              <a:t>(optionally) save the model for later use in predicting</a:t>
+            </a:r>
+          </a:p>
+          <a:p>
+            <a:pPr lvl="1"/>
+            <a:r>
+              <a:rPr lang="en-US" dirty="0"/>
+              <a:t>Make predictions</a:t>
+            </a:r>
+          </a:p>
+          <a:p>
+            <a:pPr marL="457200" lvl="1" indent="0">
+              <a:buNone/>
+            </a:pPr>
+            <a:endParaRPr lang="en-US" dirty="0"/>
+          </a:p>
+          <a:p>
+            <a:pPr marL="0" indent="0">
+              <a:buNone/>
+            </a:pPr>
+            <a:r>
+              <a:rPr lang="en-US" dirty="0" err="1"/>
+              <a:t>B.Trotta</a:t>
+            </a:r>
+            <a:r>
+              <a:rPr lang="en-US" dirty="0"/>
+              <a:t> does not save the model.  For </a:t>
+            </a:r>
+            <a:r>
+              <a:rPr lang="en-US" dirty="0" err="1"/>
+              <a:t>StarChaser</a:t>
+            </a:r>
+            <a:r>
+              <a:rPr lang="en-US" dirty="0"/>
+              <a:t> we will need this.</a:t>
+            </a:r>
+          </a:p>
+        </p:txBody>
+      </p:sp>
+    </p:spTree>
+    <p:extLst>
+      <p:ext uri="{BB962C8B-B14F-4D97-AF65-F5344CB8AC3E}">
+        <p14:creationId xmlns:p14="http://schemas.microsoft.com/office/powerpoint/2010/main" val="3574805400"/>
+      </p:ext>
+    </p:extLst>
+  </p:cSld>
+  <p:clrMapOvr>
+    <a:masterClrMapping/>
+  </p:clrMapOvr>
+</p:sld>
+</file>
+
+<file path=ppt/slides/slide46.xml><?xml version="1.0" encoding="utf-8"?>
+<p:sld xmlns:a="http://schemas.openxmlformats.org/drawingml/2006/main" xmlns:r="http://schemas.openxmlformats.org/officeDocument/2006/relationships" xmlns:p="http://schemas.openxmlformats.org/presentationml/2006/main">
+  <p:cSld>
+    <p:spTree>
+      <p:nvGrpSpPr>
+        <p:cNvPr id="1" name=""/>
+        <p:cNvGrpSpPr/>
+        <p:nvPr/>
+      </p:nvGrpSpPr>
+      <p:grpSpPr>
+        <a:xfrm>
+          <a:off x="0" y="0"/>
+          <a:ext cx="0" cy="0"/>
+          <a:chOff x="0" y="0"/>
+          <a:chExt cx="0" cy="0"/>
+        </a:xfrm>
+      </p:grpSpPr>
+      <p:sp>
+        <p:nvSpPr>
+          <p:cNvPr id="2" name="Title 1">
+            <a:extLst>
+              <a:ext uri="{FF2B5EF4-FFF2-40B4-BE49-F238E27FC236}">
+                <a16:creationId xmlns:a16="http://schemas.microsoft.com/office/drawing/2014/main" id="{5A6B8EB4-8A6A-45C6-A527-1A598DED9182}"/>
+              </a:ext>
+            </a:extLst>
+          </p:cNvPr>
+          <p:cNvSpPr>
+            <a:spLocks noGrp="1"/>
+          </p:cNvSpPr>
+          <p:nvPr>
+            <p:ph type="title"/>
+          </p:nvPr>
+        </p:nvSpPr>
+        <p:spPr/>
+        <p:txBody>
+          <a:bodyPr/>
+          <a:lstStyle/>
+          <a:p>
+            <a:r>
+              <a:rPr lang="en-US" dirty="0"/>
+              <a:t>Train [1]</a:t>
+            </a:r>
+            <a:br>
+              <a:rPr lang="en-US" dirty="0"/>
+            </a:br>
+            <a:r>
+              <a:rPr lang="en-US" sz="2400" dirty="0"/>
+              <a:t>(predict.py)</a:t>
+            </a:r>
+            <a:endParaRPr lang="en-US" dirty="0"/>
+          </a:p>
+        </p:txBody>
+      </p:sp>
+      <p:sp>
+        <p:nvSpPr>
+          <p:cNvPr id="3" name="Content Placeholder 2">
+            <a:extLst>
+              <a:ext uri="{FF2B5EF4-FFF2-40B4-BE49-F238E27FC236}">
+                <a16:creationId xmlns:a16="http://schemas.microsoft.com/office/drawing/2014/main" id="{F62A21AF-06FD-4F00-A620-C5E8F72A0991}"/>
+              </a:ext>
+            </a:extLst>
+          </p:cNvPr>
+          <p:cNvSpPr>
+            <a:spLocks noGrp="1"/>
+          </p:cNvSpPr>
+          <p:nvPr>
+            <p:ph idx="1"/>
+          </p:nvPr>
+        </p:nvSpPr>
+        <p:spPr>
+          <a:xfrm>
+            <a:off x="838200" y="1825625"/>
+            <a:ext cx="10515600" cy="1603375"/>
+          </a:xfrm>
+        </p:spPr>
+        <p:txBody>
+          <a:bodyPr/>
+          <a:lstStyle/>
+          <a:p>
+            <a:r>
+              <a:rPr lang="en-US" dirty="0"/>
+              <a:t>Read features data from file</a:t>
+            </a:r>
+          </a:p>
+          <a:p>
+            <a:r>
+              <a:rPr lang="en-US" dirty="0"/>
+              <a:t>Will be creating separate models (galactic, non-galactic).  Use “</a:t>
+            </a:r>
+            <a:r>
+              <a:rPr lang="en-US" dirty="0" err="1"/>
+              <a:t>hostgal</a:t>
+            </a:r>
+            <a:r>
+              <a:rPr lang="en-US" dirty="0"/>
+              <a:t>” as delimiter</a:t>
+            </a:r>
+          </a:p>
+        </p:txBody>
+      </p:sp>
+      <p:pic>
+        <p:nvPicPr>
+          <p:cNvPr id="4" name="Picture 3">
+            <a:extLst>
+              <a:ext uri="{FF2B5EF4-FFF2-40B4-BE49-F238E27FC236}">
+                <a16:creationId xmlns:a16="http://schemas.microsoft.com/office/drawing/2014/main" id="{60C39699-CA24-40B0-8788-EA6EC9C164AB}"/>
+              </a:ext>
+            </a:extLst>
+          </p:cNvPr>
+          <p:cNvPicPr>
+            <a:picLocks noChangeAspect="1"/>
+          </p:cNvPicPr>
+          <p:nvPr/>
+        </p:nvPicPr>
+        <p:blipFill>
+          <a:blip r:embed="rId2"/>
+          <a:stretch>
+            <a:fillRect/>
+          </a:stretch>
+        </p:blipFill>
+        <p:spPr>
+          <a:xfrm>
+            <a:off x="643694" y="3872204"/>
+            <a:ext cx="11310861" cy="2620671"/>
+          </a:xfrm>
+          <a:prstGeom prst="rect">
+            <a:avLst/>
+          </a:prstGeom>
+        </p:spPr>
+      </p:pic>
+    </p:spTree>
+    <p:extLst>
+      <p:ext uri="{BB962C8B-B14F-4D97-AF65-F5344CB8AC3E}">
+        <p14:creationId xmlns:p14="http://schemas.microsoft.com/office/powerpoint/2010/main" val="2331377046"/>
+      </p:ext>
+    </p:extLst>
+  </p:cSld>
+  <p:clrMapOvr>
+    <a:masterClrMapping/>
+  </p:clrMapOvr>
+</p:sld>
+</file>
+
+<file path=ppt/slides/slide47.xml><?xml version="1.0" encoding="utf-8"?>
+<p:sld xmlns:a="http://schemas.openxmlformats.org/drawingml/2006/main" xmlns:r="http://schemas.openxmlformats.org/officeDocument/2006/relationships" xmlns:p="http://schemas.openxmlformats.org/presentationml/2006/main">
+  <p:cSld>
+    <p:spTree>
+      <p:nvGrpSpPr>
+        <p:cNvPr id="1" name=""/>
+        <p:cNvGrpSpPr/>
+        <p:nvPr/>
+      </p:nvGrpSpPr>
+      <p:grpSpPr>
+        <a:xfrm>
+          <a:off x="0" y="0"/>
+          <a:ext cx="0" cy="0"/>
+          <a:chOff x="0" y="0"/>
+          <a:chExt cx="0" cy="0"/>
+        </a:xfrm>
+      </p:grpSpPr>
+      <p:sp>
+        <p:nvSpPr>
+          <p:cNvPr id="2" name="Title 1">
+            <a:extLst>
+              <a:ext uri="{FF2B5EF4-FFF2-40B4-BE49-F238E27FC236}">
+                <a16:creationId xmlns:a16="http://schemas.microsoft.com/office/drawing/2014/main" id="{79EC42E9-EE1B-43CB-9CC7-F1D27B14D2A0}"/>
+              </a:ext>
+            </a:extLst>
+          </p:cNvPr>
+          <p:cNvSpPr>
+            <a:spLocks noGrp="1"/>
+          </p:cNvSpPr>
+          <p:nvPr>
+            <p:ph type="title"/>
+          </p:nvPr>
+        </p:nvSpPr>
+        <p:spPr/>
+        <p:txBody>
+          <a:bodyPr/>
+          <a:lstStyle/>
+          <a:p>
+            <a:endParaRPr lang="en-US" dirty="0"/>
+          </a:p>
+        </p:txBody>
+      </p:sp>
+      <p:sp>
+        <p:nvSpPr>
+          <p:cNvPr id="3" name="Content Placeholder 2">
+            <a:extLst>
+              <a:ext uri="{FF2B5EF4-FFF2-40B4-BE49-F238E27FC236}">
+                <a16:creationId xmlns:a16="http://schemas.microsoft.com/office/drawing/2014/main" id="{B3CA4389-ED73-4B10-8957-CC584377F16A}"/>
+              </a:ext>
+            </a:extLst>
+          </p:cNvPr>
+          <p:cNvSpPr>
+            <a:spLocks noGrp="1"/>
+          </p:cNvSpPr>
+          <p:nvPr>
+            <p:ph idx="1"/>
+          </p:nvPr>
+        </p:nvSpPr>
+        <p:spPr/>
+        <p:txBody>
+          <a:bodyPr/>
+          <a:lstStyle/>
+          <a:p>
+            <a:r>
+              <a:rPr lang="en-US" dirty="0"/>
+              <a:t>x</a:t>
+            </a:r>
+          </a:p>
+        </p:txBody>
+      </p:sp>
+    </p:spTree>
+    <p:extLst>
+      <p:ext uri="{BB962C8B-B14F-4D97-AF65-F5344CB8AC3E}">
+        <p14:creationId xmlns:p14="http://schemas.microsoft.com/office/powerpoint/2010/main" val="2821162779"/>
+      </p:ext>
+    </p:extLst>
+  </p:cSld>
+  <p:clrMapOvr>
+    <a:masterClrMapping/>
+  </p:clrMapOvr>
+</p:sld>
+</file>
+
+<file path=ppt/slides/slide48.xml><?xml version="1.0" encoding="utf-8"?>
+<p:sld xmlns:a="http://schemas.openxmlformats.org/drawingml/2006/main" xmlns:r="http://schemas.openxmlformats.org/officeDocument/2006/relationships" xmlns:p="http://schemas.openxmlformats.org/presentationml/2006/main">
+  <p:cSld>
+    <p:spTree>
+      <p:nvGrpSpPr>
+        <p:cNvPr id="1" name=""/>
+        <p:cNvGrpSpPr/>
+        <p:nvPr/>
+      </p:nvGrpSpPr>
+      <p:grpSpPr>
+        <a:xfrm>
+          <a:off x="0" y="0"/>
+          <a:ext cx="0" cy="0"/>
+          <a:chOff x="0" y="0"/>
+          <a:chExt cx="0" cy="0"/>
+        </a:xfrm>
+      </p:grpSpPr>
+      <p:sp>
+        <p:nvSpPr>
+          <p:cNvPr id="2" name="Title 1">
+            <a:extLst>
+              <a:ext uri="{FF2B5EF4-FFF2-40B4-BE49-F238E27FC236}">
                 <a16:creationId xmlns:a16="http://schemas.microsoft.com/office/drawing/2014/main" id="{7B68FD03-2C2D-49AB-B74F-0F32CC7C4F8A}"/>
               </a:ext>
             </a:extLst>
@@ -8994,7 +9749,7 @@
 </p:sld>
 </file>
 
-<file path=ppt/slides/slide44.xml><?xml version="1.0" encoding="utf-8"?>
+<file path=ppt/slides/slide49.xml><?xml version="1.0" encoding="utf-8"?>
 <p:sld xmlns:a="http://schemas.openxmlformats.org/drawingml/2006/main" xmlns:r="http://schemas.openxmlformats.org/officeDocument/2006/relationships" xmlns:p="http://schemas.openxmlformats.org/presentationml/2006/main">
   <p:cSld>
     <p:spTree>

</xml_diff>